<commit_message>
Ajustado vínculo en la slide
</commit_message>
<xml_diff>
--- a/ppt/curso-devops-ulpgc.pptx
+++ b/ppt/curso-devops-ulpgc.pptx
@@ -392,7 +392,7 @@
           <a:p>
             <a:fld id="{4A3B785F-1BCE-1A46-9CAA-77ACC7103834}" type="datetimeFigureOut">
               <a:rPr lang="es-ES" smtClean="0"/>
-              <a:t>24/01/2024</a:t>
+              <a:t>01/02/2024</a:t>
             </a:fld>
             <a:endParaRPr lang="es-ES" dirty="0"/>
           </a:p>
@@ -10528,12 +10528,9 @@
               <a:rPr lang="es-ES" u="sng" dirty="0">
                 <a:hlinkClick r:id="rId4"/>
               </a:rPr>
-              <a:t>http://localhost:8080/openapi/</a:t>
+              <a:t>http://localhost:8080/openapi/swagger</a:t>
             </a:r>
-            <a:r>
-              <a:rPr lang="es-ES" u="sng" dirty="0"/>
-              <a:t>swagger-ui</a:t>
-            </a:r>
+            <a:endParaRPr lang="es-ES" u="sng" dirty="0"/>
           </a:p>
           <a:p>
             <a:pPr algn="ctr"/>
@@ -14128,14 +14125,12 @@
 </file>
 
 <file path=customXml/item1.xml><?xml version="1.0" encoding="utf-8"?>
-<p:properties xmlns:p="http://schemas.microsoft.com/office/2006/metadata/properties" xmlns:xsi="http://www.w3.org/2001/XMLSchema-instance" xmlns:pc="http://schemas.microsoft.com/office/infopath/2007/PartnerControls">
-  <documentManagement>
-    <TaxCatchAll xmlns="435026e9-b5d0-4467-bbd9-3b76a09ae0c4" xsi:nil="true"/>
-    <lcf76f155ced4ddcb4097134ff3c332f xmlns="e202ecef-a3f6-4d98-ad9b-1b77cdb87b84">
-      <Terms xmlns="http://schemas.microsoft.com/office/infopath/2007/PartnerControls"/>
-    </lcf76f155ced4ddcb4097134ff3c332f>
-  </documentManagement>
-</p:properties>
+<?mso-contentType ?>
+<FormTemplates xmlns="http://schemas.microsoft.com/sharepoint/v3/contenttype/forms">
+  <Display>DocumentLibraryForm</Display>
+  <Edit>DocumentLibraryForm</Edit>
+  <New>DocumentLibraryForm</New>
+</FormTemplates>
 </file>
 
 <file path=customXml/item2.xml><?xml version="1.0" encoding="utf-8"?>
@@ -14334,21 +14329,20 @@
 </file>
 
 <file path=customXml/item3.xml><?xml version="1.0" encoding="utf-8"?>
-<?mso-contentType ?>
-<FormTemplates xmlns="http://schemas.microsoft.com/sharepoint/v3/contenttype/forms">
-  <Display>DocumentLibraryForm</Display>
-  <Edit>DocumentLibraryForm</Edit>
-  <New>DocumentLibraryForm</New>
-</FormTemplates>
+<p:properties xmlns:p="http://schemas.microsoft.com/office/2006/metadata/properties" xmlns:xsi="http://www.w3.org/2001/XMLSchema-instance" xmlns:pc="http://schemas.microsoft.com/office/infopath/2007/PartnerControls">
+  <documentManagement>
+    <TaxCatchAll xmlns="435026e9-b5d0-4467-bbd9-3b76a09ae0c4" xsi:nil="true"/>
+    <lcf76f155ced4ddcb4097134ff3c332f xmlns="e202ecef-a3f6-4d98-ad9b-1b77cdb87b84">
+      <Terms xmlns="http://schemas.microsoft.com/office/infopath/2007/PartnerControls"/>
+    </lcf76f155ced4ddcb4097134ff3c332f>
+  </documentManagement>
+</p:properties>
 </file>
 
 <file path=customXml/itemProps1.xml><?xml version="1.0" encoding="utf-8"?>
-<ds:datastoreItem xmlns:ds="http://schemas.openxmlformats.org/officeDocument/2006/customXml" ds:itemID="{2F6D6B62-92C6-4EDE-B50E-8B81CFF669EA}">
+<ds:datastoreItem xmlns:ds="http://schemas.openxmlformats.org/officeDocument/2006/customXml" ds:itemID="{A4B54BEA-998E-408D-BCCD-09BA67DF44CE}">
   <ds:schemaRefs>
-    <ds:schemaRef ds:uri="http://schemas.microsoft.com/office/2006/metadata/properties"/>
-    <ds:schemaRef ds:uri="http://schemas.microsoft.com/office/infopath/2007/PartnerControls"/>
-    <ds:schemaRef ds:uri="435026e9-b5d0-4467-bbd9-3b76a09ae0c4"/>
-    <ds:schemaRef ds:uri="e202ecef-a3f6-4d98-ad9b-1b77cdb87b84"/>
+    <ds:schemaRef ds:uri="http://schemas.microsoft.com/sharepoint/v3/contenttype/forms"/>
   </ds:schemaRefs>
 </ds:datastoreItem>
 </file>
@@ -14373,9 +14367,12 @@
 </file>
 
 <file path=customXml/itemProps3.xml><?xml version="1.0" encoding="utf-8"?>
-<ds:datastoreItem xmlns:ds="http://schemas.openxmlformats.org/officeDocument/2006/customXml" ds:itemID="{A4B54BEA-998E-408D-BCCD-09BA67DF44CE}">
+<ds:datastoreItem xmlns:ds="http://schemas.openxmlformats.org/officeDocument/2006/customXml" ds:itemID="{2F6D6B62-92C6-4EDE-B50E-8B81CFF669EA}">
   <ds:schemaRefs>
-    <ds:schemaRef ds:uri="http://schemas.microsoft.com/sharepoint/v3/contenttype/forms"/>
+    <ds:schemaRef ds:uri="http://schemas.microsoft.com/office/2006/metadata/properties"/>
+    <ds:schemaRef ds:uri="http://schemas.microsoft.com/office/infopath/2007/PartnerControls"/>
+    <ds:schemaRef ds:uri="435026e9-b5d0-4467-bbd9-3b76a09ae0c4"/>
+    <ds:schemaRef ds:uri="e202ecef-a3f6-4d98-ad9b-1b77cdb87b84"/>
   </ds:schemaRefs>
 </ds:datastoreItem>
 </file>
</xml_diff>